<commit_message>
zauriez pu cahnger le LM comme vincent l'avait demandé...
</commit_message>
<xml_diff>
--- a/Class Presentations/4th-presentation/Group presentation 20 05.pptx
+++ b/Class Presentations/4th-presentation/Group presentation 20 05.pptx
@@ -114,7 +114,7 @@
   </p:defaultTextStyle>
   <p:extLst>
     <p:ext uri="{EFAFB233-063F-42B5-8137-9DF3F51BA10A}">
-      <p15:sldGuideLst xmlns:p15="http://schemas.microsoft.com/office/powerpoint/2012/main">
+      <p15:sldGuideLst xmlns:p15="http://schemas.microsoft.com/office/powerpoint/2012/main" xmlns="">
         <p15:guide id="1" orient="horz" pos="2160">
           <p15:clr>
             <a:srgbClr val="A4A3A4"/>
@@ -8947,23 +8947,7 @@
                   <a:srgbClr val="7F7F7F"/>
                 </a:solidFill>
               </a:rPr>
-              <a:t>Our </a:t>
-            </a:r>
-            <a:r>
-              <a:rPr lang="en-US" sz="4800" i="1" dirty="0" smtClean="0">
-                <a:solidFill>
-                  <a:srgbClr val="7F7F7F"/>
-                </a:solidFill>
-              </a:rPr>
-              <a:t>Logic </a:t>
-            </a:r>
-            <a:r>
-              <a:rPr lang="en-US" sz="4800" i="1" dirty="0" smtClean="0">
-                <a:solidFill>
-                  <a:srgbClr val="7F7F7F"/>
-                </a:solidFill>
-              </a:rPr>
-              <a:t>Model</a:t>
+              <a:t>Our Logic Model</a:t>
             </a:r>
             <a:r>
               <a:rPr lang="en-US" sz="4800" i="1" dirty="0" smtClean="0">
@@ -9020,9 +9004,9 @@
       </p:grpSpPr>
       <p:pic>
         <p:nvPicPr>
-          <p:cNvPr id="4" name="Image 3"/>
+          <p:cNvPr id="1026" name="Picture 2"/>
           <p:cNvPicPr>
-            <a:picLocks noChangeAspect="1"/>
+            <a:picLocks noChangeAspect="1" noChangeArrowheads="1"/>
           </p:cNvPicPr>
           <p:nvPr/>
         </p:nvPicPr>
@@ -9034,18 +9018,42 @@
               </a:ext>
             </a:extLst>
           </a:blip>
+          <a:srcRect/>
           <a:stretch>
             <a:fillRect/>
           </a:stretch>
         </p:blipFill>
-        <p:spPr>
+        <p:spPr bwMode="auto">
           <a:xfrm>
-            <a:off x="261336" y="375811"/>
-            <a:ext cx="8621328" cy="6106377"/>
+            <a:off x="127788" y="397564"/>
+            <a:ext cx="8878114" cy="5950225"/>
           </a:xfrm>
           <a:prstGeom prst="rect">
             <a:avLst/>
           </a:prstGeom>
+          <a:noFill/>
+          <a:ln>
+            <a:noFill/>
+          </a:ln>
+          <a:extLst>
+            <a:ext uri="{909E8E84-426E-40DD-AFC4-6F175D3DCCD1}">
+              <a14:hiddenFill xmlns:a14="http://schemas.microsoft.com/office/drawing/2010/main">
+                <a:solidFill>
+                  <a:schemeClr val="accent1"/>
+                </a:solidFill>
+              </a14:hiddenFill>
+            </a:ext>
+            <a:ext uri="{91240B29-F687-4F45-9708-019B960494DF}">
+              <a14:hiddenLine xmlns:a14="http://schemas.microsoft.com/office/drawing/2010/main" w="9525">
+                <a:solidFill>
+                  <a:schemeClr val="tx1"/>
+                </a:solidFill>
+                <a:miter lim="800000"/>
+                <a:headEnd/>
+                <a:tailEnd/>
+              </a14:hiddenLine>
+            </a:ext>
+          </a:extLst>
         </p:spPr>
       </p:pic>
     </p:spTree>
@@ -9362,6 +9370,13 @@
   <p:clrMapOvr>
     <a:masterClrMapping/>
   </p:clrMapOvr>
+  <p:timing>
+    <p:tnLst>
+      <p:par>
+        <p:cTn id="1" dur="indefinite" restart="never" nodeType="tmRoot"/>
+      </p:par>
+    </p:tnLst>
+  </p:timing>
 </p:sld>
 </file>
 
@@ -9416,6 +9431,13 @@
   <p:clrMapOvr>
     <a:masterClrMapping/>
   </p:clrMapOvr>
+  <p:timing>
+    <p:tnLst>
+      <p:par>
+        <p:cTn id="1" dur="indefinite" restart="never" nodeType="tmRoot"/>
+      </p:par>
+    </p:tnLst>
+  </p:timing>
 </p:sld>
 </file>
 

</xml_diff>